<commit_message>
Dummy modal added to choose elements position and strength
</commit_message>
<xml_diff>
--- a/Presentation1.pptx
+++ b/Presentation1.pptx
@@ -6,6 +6,7 @@
   </p:sldMasterIdLst>
   <p:sldIdLst>
     <p:sldId id="256" r:id="rId2"/>
+    <p:sldId id="257" r:id="rId3"/>
   </p:sldIdLst>
   <p:sldSz cx="12192000" cy="6858000"/>
   <p:notesSz cx="6858000" cy="9144000"/>
@@ -261,7 +262,7 @@
           <a:p>
             <a:fld id="{CA8DB2DD-732B-4715-84E2-EC4C82A48937}" type="datetimeFigureOut">
               <a:rPr lang="en-GB" smtClean="0"/>
-              <a:t>21/12/2023</a:t>
+              <a:t>22/12/2023</a:t>
             </a:fld>
             <a:endParaRPr lang="en-GB"/>
           </a:p>
@@ -461,7 +462,7 @@
           <a:p>
             <a:fld id="{CA8DB2DD-732B-4715-84E2-EC4C82A48937}" type="datetimeFigureOut">
               <a:rPr lang="en-GB" smtClean="0"/>
-              <a:t>21/12/2023</a:t>
+              <a:t>22/12/2023</a:t>
             </a:fld>
             <a:endParaRPr lang="en-GB"/>
           </a:p>
@@ -671,7 +672,7 @@
           <a:p>
             <a:fld id="{CA8DB2DD-732B-4715-84E2-EC4C82A48937}" type="datetimeFigureOut">
               <a:rPr lang="en-GB" smtClean="0"/>
-              <a:t>21/12/2023</a:t>
+              <a:t>22/12/2023</a:t>
             </a:fld>
             <a:endParaRPr lang="en-GB"/>
           </a:p>
@@ -871,7 +872,7 @@
           <a:p>
             <a:fld id="{CA8DB2DD-732B-4715-84E2-EC4C82A48937}" type="datetimeFigureOut">
               <a:rPr lang="en-GB" smtClean="0"/>
-              <a:t>21/12/2023</a:t>
+              <a:t>22/12/2023</a:t>
             </a:fld>
             <a:endParaRPr lang="en-GB"/>
           </a:p>
@@ -1147,7 +1148,7 @@
           <a:p>
             <a:fld id="{CA8DB2DD-732B-4715-84E2-EC4C82A48937}" type="datetimeFigureOut">
               <a:rPr lang="en-GB" smtClean="0"/>
-              <a:t>21/12/2023</a:t>
+              <a:t>22/12/2023</a:t>
             </a:fld>
             <a:endParaRPr lang="en-GB"/>
           </a:p>
@@ -1415,7 +1416,7 @@
           <a:p>
             <a:fld id="{CA8DB2DD-732B-4715-84E2-EC4C82A48937}" type="datetimeFigureOut">
               <a:rPr lang="en-GB" smtClean="0"/>
-              <a:t>21/12/2023</a:t>
+              <a:t>22/12/2023</a:t>
             </a:fld>
             <a:endParaRPr lang="en-GB"/>
           </a:p>
@@ -1830,7 +1831,7 @@
           <a:p>
             <a:fld id="{CA8DB2DD-732B-4715-84E2-EC4C82A48937}" type="datetimeFigureOut">
               <a:rPr lang="en-GB" smtClean="0"/>
-              <a:t>21/12/2023</a:t>
+              <a:t>22/12/2023</a:t>
             </a:fld>
             <a:endParaRPr lang="en-GB"/>
           </a:p>
@@ -1972,7 +1973,7 @@
           <a:p>
             <a:fld id="{CA8DB2DD-732B-4715-84E2-EC4C82A48937}" type="datetimeFigureOut">
               <a:rPr lang="en-GB" smtClean="0"/>
-              <a:t>21/12/2023</a:t>
+              <a:t>22/12/2023</a:t>
             </a:fld>
             <a:endParaRPr lang="en-GB"/>
           </a:p>
@@ -2085,7 +2086,7 @@
           <a:p>
             <a:fld id="{CA8DB2DD-732B-4715-84E2-EC4C82A48937}" type="datetimeFigureOut">
               <a:rPr lang="en-GB" smtClean="0"/>
-              <a:t>21/12/2023</a:t>
+              <a:t>22/12/2023</a:t>
             </a:fld>
             <a:endParaRPr lang="en-GB"/>
           </a:p>
@@ -2398,7 +2399,7 @@
           <a:p>
             <a:fld id="{CA8DB2DD-732B-4715-84E2-EC4C82A48937}" type="datetimeFigureOut">
               <a:rPr lang="en-GB" smtClean="0"/>
-              <a:t>21/12/2023</a:t>
+              <a:t>22/12/2023</a:t>
             </a:fld>
             <a:endParaRPr lang="en-GB"/>
           </a:p>
@@ -2687,7 +2688,7 @@
           <a:p>
             <a:fld id="{CA8DB2DD-732B-4715-84E2-EC4C82A48937}" type="datetimeFigureOut">
               <a:rPr lang="en-GB" smtClean="0"/>
-              <a:t>21/12/2023</a:t>
+              <a:t>22/12/2023</a:t>
             </a:fld>
             <a:endParaRPr lang="en-GB"/>
           </a:p>
@@ -2930,7 +2931,7 @@
           <a:p>
             <a:fld id="{CA8DB2DD-732B-4715-84E2-EC4C82A48937}" type="datetimeFigureOut">
               <a:rPr lang="en-GB" smtClean="0"/>
-              <a:t>21/12/2023</a:t>
+              <a:t>22/12/2023</a:t>
             </a:fld>
             <a:endParaRPr lang="en-GB"/>
           </a:p>
@@ -4946,6 +4947,563 @@
 </p:sld>
 </file>
 
+<file path=ppt/slides/slide2.xml><?xml version="1.0" encoding="utf-8"?>
+<p:sld xmlns:a="http://schemas.openxmlformats.org/drawingml/2006/main" xmlns:r="http://schemas.openxmlformats.org/officeDocument/2006/relationships" xmlns:p="http://schemas.openxmlformats.org/presentationml/2006/main">
+  <p:cSld>
+    <p:spTree>
+      <p:nvGrpSpPr>
+        <p:cNvPr id="1" name=""/>
+        <p:cNvGrpSpPr/>
+        <p:nvPr/>
+      </p:nvGrpSpPr>
+      <p:grpSpPr>
+        <a:xfrm>
+          <a:off x="0" y="0"/>
+          <a:ext cx="0" cy="0"/>
+          <a:chOff x="0" y="0"/>
+          <a:chExt cx="0" cy="0"/>
+        </a:xfrm>
+      </p:grpSpPr>
+      <p:sp>
+        <p:nvSpPr>
+          <p:cNvPr id="4" name="Oval 3">
+            <a:extLst>
+              <a:ext uri="{FF2B5EF4-FFF2-40B4-BE49-F238E27FC236}">
+                <a16:creationId xmlns:a16="http://schemas.microsoft.com/office/drawing/2014/main" id="{910B6EE8-2D7A-7DB5-B005-8C0131E03DA3}"/>
+              </a:ext>
+            </a:extLst>
+          </p:cNvPr>
+          <p:cNvSpPr/>
+          <p:nvPr/>
+        </p:nvSpPr>
+        <p:spPr>
+          <a:xfrm>
+            <a:off x="172528" y="146649"/>
+            <a:ext cx="288330" cy="288330"/>
+          </a:xfrm>
+          <a:prstGeom prst="ellipse">
+            <a:avLst/>
+          </a:prstGeom>
+          <a:solidFill>
+            <a:schemeClr val="accent6">
+              <a:lumMod val="20000"/>
+              <a:lumOff val="80000"/>
+            </a:schemeClr>
+          </a:solidFill>
+        </p:spPr>
+        <p:style>
+          <a:lnRef idx="2">
+            <a:schemeClr val="accent1">
+              <a:shade val="15000"/>
+            </a:schemeClr>
+          </a:lnRef>
+          <a:fillRef idx="1">
+            <a:schemeClr val="accent1"/>
+          </a:fillRef>
+          <a:effectRef idx="0">
+            <a:schemeClr val="accent1"/>
+          </a:effectRef>
+          <a:fontRef idx="minor">
+            <a:schemeClr val="lt1"/>
+          </a:fontRef>
+        </p:style>
+        <p:txBody>
+          <a:bodyPr rtlCol="0" anchor="ctr"/>
+          <a:lstStyle/>
+          <a:p>
+            <a:pPr algn="ctr"/>
+            <a:r>
+              <a:rPr lang="en-GB" dirty="0">
+                <a:ln w="0"/>
+                <a:solidFill>
+                  <a:schemeClr val="tx1"/>
+                </a:solidFill>
+                <a:effectLst>
+                  <a:outerShdw blurRad="38100" dist="19050" dir="2700000" algn="tl" rotWithShape="0">
+                    <a:schemeClr val="dk1">
+                      <a:alpha val="40000"/>
+                    </a:schemeClr>
+                  </a:outerShdw>
+                </a:effectLst>
+              </a:rPr>
+              <a:t>S</a:t>
+            </a:r>
+          </a:p>
+        </p:txBody>
+      </p:sp>
+      <p:sp>
+        <p:nvSpPr>
+          <p:cNvPr id="3" name="Oval 2">
+            <a:extLst>
+              <a:ext uri="{FF2B5EF4-FFF2-40B4-BE49-F238E27FC236}">
+                <a16:creationId xmlns:a16="http://schemas.microsoft.com/office/drawing/2014/main" id="{614ED2A8-AC4F-87EF-937F-C271AEFB4858}"/>
+              </a:ext>
+            </a:extLst>
+          </p:cNvPr>
+          <p:cNvSpPr/>
+          <p:nvPr/>
+        </p:nvSpPr>
+        <p:spPr>
+          <a:xfrm>
+            <a:off x="551412" y="146649"/>
+            <a:ext cx="288330" cy="288330"/>
+          </a:xfrm>
+          <a:prstGeom prst="ellipse">
+            <a:avLst/>
+          </a:prstGeom>
+          <a:solidFill>
+            <a:schemeClr val="accent5">
+              <a:lumMod val="20000"/>
+              <a:lumOff val="80000"/>
+            </a:schemeClr>
+          </a:solidFill>
+        </p:spPr>
+        <p:style>
+          <a:lnRef idx="2">
+            <a:schemeClr val="accent1">
+              <a:shade val="15000"/>
+            </a:schemeClr>
+          </a:lnRef>
+          <a:fillRef idx="1">
+            <a:schemeClr val="accent1"/>
+          </a:fillRef>
+          <a:effectRef idx="0">
+            <a:schemeClr val="accent1"/>
+          </a:effectRef>
+          <a:fontRef idx="minor">
+            <a:schemeClr val="lt1"/>
+          </a:fontRef>
+        </p:style>
+        <p:txBody>
+          <a:bodyPr rtlCol="0" anchor="ctr"/>
+          <a:lstStyle/>
+          <a:p>
+            <a:pPr algn="ctr"/>
+            <a:r>
+              <a:rPr lang="en-GB" dirty="0">
+                <a:ln w="0"/>
+                <a:solidFill>
+                  <a:schemeClr val="tx1"/>
+                </a:solidFill>
+                <a:effectLst>
+                  <a:outerShdw blurRad="38100" dist="19050" dir="2700000" algn="tl" rotWithShape="0">
+                    <a:schemeClr val="dk1">
+                      <a:alpha val="40000"/>
+                    </a:schemeClr>
+                  </a:outerShdw>
+                </a:effectLst>
+              </a:rPr>
+              <a:t>V</a:t>
+            </a:r>
+          </a:p>
+        </p:txBody>
+      </p:sp>
+      <p:sp>
+        <p:nvSpPr>
+          <p:cNvPr id="5" name="Oval 4">
+            <a:extLst>
+              <a:ext uri="{FF2B5EF4-FFF2-40B4-BE49-F238E27FC236}">
+                <a16:creationId xmlns:a16="http://schemas.microsoft.com/office/drawing/2014/main" id="{C26E6CA0-431E-7C0B-EC03-8567DBA024CC}"/>
+              </a:ext>
+            </a:extLst>
+          </p:cNvPr>
+          <p:cNvSpPr/>
+          <p:nvPr/>
+        </p:nvSpPr>
+        <p:spPr>
+          <a:xfrm>
+            <a:off x="930296" y="146649"/>
+            <a:ext cx="288330" cy="288330"/>
+          </a:xfrm>
+          <a:prstGeom prst="ellipse">
+            <a:avLst/>
+          </a:prstGeom>
+          <a:solidFill>
+            <a:schemeClr val="accent4">
+              <a:lumMod val="20000"/>
+              <a:lumOff val="80000"/>
+            </a:schemeClr>
+          </a:solidFill>
+        </p:spPr>
+        <p:style>
+          <a:lnRef idx="2">
+            <a:schemeClr val="accent1">
+              <a:shade val="15000"/>
+            </a:schemeClr>
+          </a:lnRef>
+          <a:fillRef idx="1">
+            <a:schemeClr val="accent1"/>
+          </a:fillRef>
+          <a:effectRef idx="0">
+            <a:schemeClr val="accent1"/>
+          </a:effectRef>
+          <a:fontRef idx="minor">
+            <a:schemeClr val="lt1"/>
+          </a:fontRef>
+        </p:style>
+        <p:txBody>
+          <a:bodyPr rtlCol="0" anchor="ctr"/>
+          <a:lstStyle/>
+          <a:p>
+            <a:pPr algn="ctr"/>
+            <a:r>
+              <a:rPr lang="en-GB" dirty="0">
+                <a:ln w="0"/>
+                <a:solidFill>
+                  <a:schemeClr val="tx1"/>
+                </a:solidFill>
+                <a:effectLst>
+                  <a:outerShdw blurRad="38100" dist="19050" dir="2700000" algn="tl" rotWithShape="0">
+                    <a:schemeClr val="dk1">
+                      <a:alpha val="40000"/>
+                    </a:schemeClr>
+                  </a:outerShdw>
+                </a:effectLst>
+              </a:rPr>
+              <a:t>C</a:t>
+            </a:r>
+          </a:p>
+        </p:txBody>
+      </p:sp>
+      <p:sp>
+        <p:nvSpPr>
+          <p:cNvPr id="7" name="Oval 6">
+            <a:extLst>
+              <a:ext uri="{FF2B5EF4-FFF2-40B4-BE49-F238E27FC236}">
+                <a16:creationId xmlns:a16="http://schemas.microsoft.com/office/drawing/2014/main" id="{763E8D1D-2A40-AB5B-772E-75B6AE070015}"/>
+              </a:ext>
+            </a:extLst>
+          </p:cNvPr>
+          <p:cNvSpPr/>
+          <p:nvPr/>
+        </p:nvSpPr>
+        <p:spPr>
+          <a:xfrm>
+            <a:off x="1309180" y="146649"/>
+            <a:ext cx="288330" cy="288330"/>
+          </a:xfrm>
+          <a:prstGeom prst="ellipse">
+            <a:avLst/>
+          </a:prstGeom>
+          <a:solidFill>
+            <a:schemeClr val="accent3">
+              <a:lumMod val="20000"/>
+              <a:lumOff val="80000"/>
+            </a:schemeClr>
+          </a:solidFill>
+        </p:spPr>
+        <p:style>
+          <a:lnRef idx="2">
+            <a:schemeClr val="accent1">
+              <a:shade val="15000"/>
+            </a:schemeClr>
+          </a:lnRef>
+          <a:fillRef idx="1">
+            <a:schemeClr val="accent1"/>
+          </a:fillRef>
+          <a:effectRef idx="0">
+            <a:schemeClr val="accent1"/>
+          </a:effectRef>
+          <a:fontRef idx="minor">
+            <a:schemeClr val="lt1"/>
+          </a:fontRef>
+        </p:style>
+        <p:txBody>
+          <a:bodyPr rtlCol="0" anchor="ctr"/>
+          <a:lstStyle/>
+          <a:p>
+            <a:pPr algn="ctr"/>
+            <a:r>
+              <a:rPr lang="en-GB" dirty="0">
+                <a:ln w="0"/>
+                <a:solidFill>
+                  <a:schemeClr val="tx1"/>
+                </a:solidFill>
+                <a:effectLst>
+                  <a:outerShdw blurRad="38100" dist="19050" dir="2700000" algn="tl" rotWithShape="0">
+                    <a:schemeClr val="dk1">
+                      <a:alpha val="40000"/>
+                    </a:schemeClr>
+                  </a:outerShdw>
+                </a:effectLst>
+              </a:rPr>
+              <a:t>D</a:t>
+            </a:r>
+          </a:p>
+        </p:txBody>
+      </p:sp>
+      <p:sp>
+        <p:nvSpPr>
+          <p:cNvPr id="11" name="Oval 10">
+            <a:extLst>
+              <a:ext uri="{FF2B5EF4-FFF2-40B4-BE49-F238E27FC236}">
+                <a16:creationId xmlns:a16="http://schemas.microsoft.com/office/drawing/2014/main" id="{6AD92B7F-E2C8-1D03-1053-4A8B8657E17E}"/>
+              </a:ext>
+            </a:extLst>
+          </p:cNvPr>
+          <p:cNvSpPr/>
+          <p:nvPr/>
+        </p:nvSpPr>
+        <p:spPr>
+          <a:xfrm>
+            <a:off x="1688064" y="146649"/>
+            <a:ext cx="288330" cy="288330"/>
+          </a:xfrm>
+          <a:prstGeom prst="ellipse">
+            <a:avLst/>
+          </a:prstGeom>
+          <a:solidFill>
+            <a:schemeClr val="accent2">
+              <a:lumMod val="20000"/>
+              <a:lumOff val="80000"/>
+            </a:schemeClr>
+          </a:solidFill>
+        </p:spPr>
+        <p:style>
+          <a:lnRef idx="2">
+            <a:schemeClr val="accent1">
+              <a:shade val="15000"/>
+            </a:schemeClr>
+          </a:lnRef>
+          <a:fillRef idx="1">
+            <a:schemeClr val="accent1"/>
+          </a:fillRef>
+          <a:effectRef idx="0">
+            <a:schemeClr val="accent1"/>
+          </a:effectRef>
+          <a:fontRef idx="minor">
+            <a:schemeClr val="lt1"/>
+          </a:fontRef>
+        </p:style>
+        <p:txBody>
+          <a:bodyPr rtlCol="0" anchor="ctr"/>
+          <a:lstStyle/>
+          <a:p>
+            <a:pPr algn="ctr"/>
+            <a:r>
+              <a:rPr lang="en-GB" dirty="0">
+                <a:ln w="0"/>
+                <a:solidFill>
+                  <a:schemeClr val="tx1"/>
+                </a:solidFill>
+                <a:effectLst>
+                  <a:outerShdw blurRad="38100" dist="19050" dir="2700000" algn="tl" rotWithShape="0">
+                    <a:schemeClr val="dk1">
+                      <a:alpha val="40000"/>
+                    </a:schemeClr>
+                  </a:outerShdw>
+                </a:effectLst>
+              </a:rPr>
+              <a:t>O</a:t>
+            </a:r>
+          </a:p>
+        </p:txBody>
+      </p:sp>
+      <p:sp>
+        <p:nvSpPr>
+          <p:cNvPr id="12" name="Oval 11">
+            <a:extLst>
+              <a:ext uri="{FF2B5EF4-FFF2-40B4-BE49-F238E27FC236}">
+                <a16:creationId xmlns:a16="http://schemas.microsoft.com/office/drawing/2014/main" id="{0F708006-9D3C-FCE9-9E2C-37AAE80CBB64}"/>
+              </a:ext>
+            </a:extLst>
+          </p:cNvPr>
+          <p:cNvSpPr/>
+          <p:nvPr/>
+        </p:nvSpPr>
+        <p:spPr>
+          <a:xfrm>
+            <a:off x="2066948" y="146649"/>
+            <a:ext cx="288330" cy="288330"/>
+          </a:xfrm>
+          <a:prstGeom prst="ellipse">
+            <a:avLst/>
+          </a:prstGeom>
+          <a:solidFill>
+            <a:srgbClr val="F3DBEE"/>
+          </a:solidFill>
+        </p:spPr>
+        <p:style>
+          <a:lnRef idx="2">
+            <a:schemeClr val="accent1">
+              <a:shade val="15000"/>
+            </a:schemeClr>
+          </a:lnRef>
+          <a:fillRef idx="1">
+            <a:schemeClr val="accent1"/>
+          </a:fillRef>
+          <a:effectRef idx="0">
+            <a:schemeClr val="accent1"/>
+          </a:effectRef>
+          <a:fontRef idx="minor">
+            <a:schemeClr val="lt1"/>
+          </a:fontRef>
+        </p:style>
+        <p:txBody>
+          <a:bodyPr rtlCol="0" anchor="ctr"/>
+          <a:lstStyle/>
+          <a:p>
+            <a:pPr algn="ctr"/>
+            <a:r>
+              <a:rPr lang="en-GB" dirty="0">
+                <a:ln w="0"/>
+                <a:solidFill>
+                  <a:schemeClr val="tx1"/>
+                </a:solidFill>
+                <a:effectLst>
+                  <a:outerShdw blurRad="38100" dist="19050" dir="2700000" algn="tl" rotWithShape="0">
+                    <a:schemeClr val="dk1">
+                      <a:alpha val="40000"/>
+                    </a:schemeClr>
+                  </a:outerShdw>
+                </a:effectLst>
+              </a:rPr>
+              <a:t>Y</a:t>
+            </a:r>
+          </a:p>
+        </p:txBody>
+      </p:sp>
+      <p:sp>
+        <p:nvSpPr>
+          <p:cNvPr id="13" name="Oval 12">
+            <a:extLst>
+              <a:ext uri="{FF2B5EF4-FFF2-40B4-BE49-F238E27FC236}">
+                <a16:creationId xmlns:a16="http://schemas.microsoft.com/office/drawing/2014/main" id="{2104DBC7-8752-0D45-49FF-E004BBC70485}"/>
+              </a:ext>
+            </a:extLst>
+          </p:cNvPr>
+          <p:cNvSpPr/>
+          <p:nvPr/>
+        </p:nvSpPr>
+        <p:spPr>
+          <a:xfrm>
+            <a:off x="2445832" y="146649"/>
+            <a:ext cx="288330" cy="288330"/>
+          </a:xfrm>
+          <a:prstGeom prst="ellipse">
+            <a:avLst/>
+          </a:prstGeom>
+          <a:solidFill>
+            <a:srgbClr val="F2D8D8"/>
+          </a:solidFill>
+        </p:spPr>
+        <p:style>
+          <a:lnRef idx="2">
+            <a:schemeClr val="accent1">
+              <a:shade val="15000"/>
+            </a:schemeClr>
+          </a:lnRef>
+          <a:fillRef idx="1">
+            <a:schemeClr val="accent1"/>
+          </a:fillRef>
+          <a:effectRef idx="0">
+            <a:schemeClr val="accent1"/>
+          </a:effectRef>
+          <a:fontRef idx="minor">
+            <a:schemeClr val="lt1"/>
+          </a:fontRef>
+        </p:style>
+        <p:txBody>
+          <a:bodyPr rtlCol="0" anchor="ctr"/>
+          <a:lstStyle/>
+          <a:p>
+            <a:pPr algn="ctr"/>
+            <a:r>
+              <a:rPr lang="en-GB" dirty="0">
+                <a:ln w="0"/>
+                <a:solidFill>
+                  <a:schemeClr val="tx1"/>
+                </a:solidFill>
+                <a:effectLst>
+                  <a:outerShdw blurRad="38100" dist="19050" dir="2700000" algn="tl" rotWithShape="0">
+                    <a:schemeClr val="dk1">
+                      <a:alpha val="40000"/>
+                    </a:schemeClr>
+                  </a:outerShdw>
+                </a:effectLst>
+              </a:rPr>
+              <a:t>P</a:t>
+            </a:r>
+          </a:p>
+        </p:txBody>
+      </p:sp>
+      <p:sp>
+        <p:nvSpPr>
+          <p:cNvPr id="14" name="Oval 13">
+            <a:extLst>
+              <a:ext uri="{FF2B5EF4-FFF2-40B4-BE49-F238E27FC236}">
+                <a16:creationId xmlns:a16="http://schemas.microsoft.com/office/drawing/2014/main" id="{137894E7-7127-82BA-EB4F-D9CE58DBB3F4}"/>
+              </a:ext>
+            </a:extLst>
+          </p:cNvPr>
+          <p:cNvSpPr/>
+          <p:nvPr/>
+        </p:nvSpPr>
+        <p:spPr>
+          <a:xfrm>
+            <a:off x="2824716" y="146649"/>
+            <a:ext cx="288330" cy="288330"/>
+          </a:xfrm>
+          <a:prstGeom prst="ellipse">
+            <a:avLst/>
+          </a:prstGeom>
+          <a:solidFill>
+            <a:srgbClr val="F1F1D9"/>
+          </a:solidFill>
+        </p:spPr>
+        <p:style>
+          <a:lnRef idx="2">
+            <a:schemeClr val="accent1">
+              <a:shade val="15000"/>
+            </a:schemeClr>
+          </a:lnRef>
+          <a:fillRef idx="1">
+            <a:schemeClr val="accent1"/>
+          </a:fillRef>
+          <a:effectRef idx="0">
+            <a:schemeClr val="accent1"/>
+          </a:effectRef>
+          <a:fontRef idx="minor">
+            <a:schemeClr val="lt1"/>
+          </a:fontRef>
+        </p:style>
+        <p:txBody>
+          <a:bodyPr rtlCol="0" anchor="ctr"/>
+          <a:lstStyle/>
+          <a:p>
+            <a:pPr algn="ctr"/>
+            <a:r>
+              <a:rPr lang="en-GB" dirty="0">
+                <a:ln w="0"/>
+                <a:solidFill>
+                  <a:schemeClr val="tx1"/>
+                </a:solidFill>
+                <a:effectLst>
+                  <a:outerShdw blurRad="38100" dist="19050" dir="2700000" algn="tl" rotWithShape="0">
+                    <a:schemeClr val="dk1">
+                      <a:alpha val="40000"/>
+                    </a:schemeClr>
+                  </a:outerShdw>
+                </a:effectLst>
+              </a:rPr>
+              <a:t>B</a:t>
+            </a:r>
+          </a:p>
+        </p:txBody>
+      </p:sp>
+    </p:spTree>
+    <p:extLst>
+      <p:ext uri="{BB962C8B-B14F-4D97-AF65-F5344CB8AC3E}">
+        <p14:creationId xmlns:p14="http://schemas.microsoft.com/office/powerpoint/2010/main" val="730813348"/>
+      </p:ext>
+    </p:extLst>
+  </p:cSld>
+  <p:clrMapOvr>
+    <a:masterClrMapping/>
+  </p:clrMapOvr>
+</p:sld>
+</file>
+
 <file path=ppt/theme/theme1.xml><?xml version="1.0" encoding="utf-8"?>
 <a:theme xmlns:a="http://schemas.openxmlformats.org/drawingml/2006/main" name="Office Theme">
   <a:themeElements>

</xml_diff>